<commit_message>
Small changes to index.html
</commit_message>
<xml_diff>
--- a/extra-files/code-louisville-js-task-app.pptx
+++ b/extra-files/code-louisville-js-task-app.pptx
@@ -197,7 +197,7 @@
           <a:p>
             <a:fld id="{17F58322-1471-4DFD-BB86-A7875EB5428B}" type="datetimeFigureOut">
               <a:rPr lang="en-US" smtClean="0"/>
-              <a:t>10/19/2021</a:t>
+              <a:t>10/25/2021</a:t>
             </a:fld>
             <a:endParaRPr lang="en-US"/>
           </a:p>
@@ -695,7 +695,7 @@
           <a:p>
             <a:fld id="{3B0D9B70-C420-4220-BB97-72DD33D740D8}" type="datetimeFigureOut">
               <a:rPr lang="en-US" smtClean="0"/>
-              <a:t>10/19/2021</a:t>
+              <a:t>10/25/2021</a:t>
             </a:fld>
             <a:endParaRPr lang="en-US"/>
           </a:p>
@@ -893,7 +893,7 @@
           <a:p>
             <a:fld id="{3B0D9B70-C420-4220-BB97-72DD33D740D8}" type="datetimeFigureOut">
               <a:rPr lang="en-US" smtClean="0"/>
-              <a:t>10/19/2021</a:t>
+              <a:t>10/25/2021</a:t>
             </a:fld>
             <a:endParaRPr lang="en-US"/>
           </a:p>
@@ -1101,7 +1101,7 @@
           <a:p>
             <a:fld id="{3B0D9B70-C420-4220-BB97-72DD33D740D8}" type="datetimeFigureOut">
               <a:rPr lang="en-US" smtClean="0"/>
-              <a:t>10/19/2021</a:t>
+              <a:t>10/25/2021</a:t>
             </a:fld>
             <a:endParaRPr lang="en-US"/>
           </a:p>
@@ -1299,7 +1299,7 @@
           <a:p>
             <a:fld id="{3B0D9B70-C420-4220-BB97-72DD33D740D8}" type="datetimeFigureOut">
               <a:rPr lang="en-US" smtClean="0"/>
-              <a:t>10/19/2021</a:t>
+              <a:t>10/25/2021</a:t>
             </a:fld>
             <a:endParaRPr lang="en-US"/>
           </a:p>
@@ -1574,7 +1574,7 @@
           <a:p>
             <a:fld id="{3B0D9B70-C420-4220-BB97-72DD33D740D8}" type="datetimeFigureOut">
               <a:rPr lang="en-US" smtClean="0"/>
-              <a:t>10/19/2021</a:t>
+              <a:t>10/25/2021</a:t>
             </a:fld>
             <a:endParaRPr lang="en-US"/>
           </a:p>
@@ -1839,7 +1839,7 @@
           <a:p>
             <a:fld id="{3B0D9B70-C420-4220-BB97-72DD33D740D8}" type="datetimeFigureOut">
               <a:rPr lang="en-US" smtClean="0"/>
-              <a:t>10/19/2021</a:t>
+              <a:t>10/25/2021</a:t>
             </a:fld>
             <a:endParaRPr lang="en-US"/>
           </a:p>
@@ -2251,7 +2251,7 @@
           <a:p>
             <a:fld id="{3B0D9B70-C420-4220-BB97-72DD33D740D8}" type="datetimeFigureOut">
               <a:rPr lang="en-US" smtClean="0"/>
-              <a:t>10/19/2021</a:t>
+              <a:t>10/25/2021</a:t>
             </a:fld>
             <a:endParaRPr lang="en-US"/>
           </a:p>
@@ -2392,7 +2392,7 @@
           <a:p>
             <a:fld id="{3B0D9B70-C420-4220-BB97-72DD33D740D8}" type="datetimeFigureOut">
               <a:rPr lang="en-US" smtClean="0"/>
-              <a:t>10/19/2021</a:t>
+              <a:t>10/25/2021</a:t>
             </a:fld>
             <a:endParaRPr lang="en-US"/>
           </a:p>
@@ -2505,7 +2505,7 @@
           <a:p>
             <a:fld id="{3B0D9B70-C420-4220-BB97-72DD33D740D8}" type="datetimeFigureOut">
               <a:rPr lang="en-US" smtClean="0"/>
-              <a:t>10/19/2021</a:t>
+              <a:t>10/25/2021</a:t>
             </a:fld>
             <a:endParaRPr lang="en-US"/>
           </a:p>
@@ -2816,7 +2816,7 @@
           <a:p>
             <a:fld id="{3B0D9B70-C420-4220-BB97-72DD33D740D8}" type="datetimeFigureOut">
               <a:rPr lang="en-US" smtClean="0"/>
-              <a:t>10/19/2021</a:t>
+              <a:t>10/25/2021</a:t>
             </a:fld>
             <a:endParaRPr lang="en-US"/>
           </a:p>
@@ -3104,7 +3104,7 @@
           <a:p>
             <a:fld id="{3B0D9B70-C420-4220-BB97-72DD33D740D8}" type="datetimeFigureOut">
               <a:rPr lang="en-US" smtClean="0"/>
-              <a:t>10/19/2021</a:t>
+              <a:t>10/25/2021</a:t>
             </a:fld>
             <a:endParaRPr lang="en-US"/>
           </a:p>
@@ -3345,7 +3345,7 @@
           <a:p>
             <a:fld id="{3B0D9B70-C420-4220-BB97-72DD33D740D8}" type="datetimeFigureOut">
               <a:rPr lang="en-US" smtClean="0"/>
-              <a:t>10/19/2021</a:t>
+              <a:t>10/25/2021</a:t>
             </a:fld>
             <a:endParaRPr lang="en-US"/>
           </a:p>
@@ -4047,9 +4047,9 @@
           <a:bodyPr rtlCol="0" anchor="t" anchorCtr="0"/>
           <a:lstStyle/>
           <a:p>
-            <a:pPr marL="285750" indent="-285750">
-              <a:buFont typeface="Wingdings" panose="05000000000000000000" pitchFamily="2" charset="2"/>
-              <a:buChar char="ü"/>
+            <a:pPr marL="342900" indent="-342900">
+              <a:buFont typeface="+mj-lt"/>
+              <a:buAutoNum type="arabicPeriod"/>
             </a:pPr>
             <a:r>
               <a:rPr lang="en-US" dirty="0">
@@ -4057,13 +4057,13 @@
                   <a:schemeClr val="tx1"/>
                 </a:solidFill>
               </a:rPr>
-              <a:t>Call Doctor</a:t>
-            </a:r>
-          </a:p>
-          <a:p>
-            <a:pPr marL="285750" indent="-285750">
-              <a:buFont typeface="Wingdings" panose="05000000000000000000" pitchFamily="2" charset="2"/>
-              <a:buChar char="ü"/>
+              <a:t>Item</a:t>
+            </a:r>
+          </a:p>
+          <a:p>
+            <a:pPr marL="342900" indent="-342900">
+              <a:buFont typeface="+mj-lt"/>
+              <a:buAutoNum type="arabicPeriod"/>
             </a:pPr>
             <a:r>
               <a:rPr lang="en-US" dirty="0">
@@ -4071,13 +4071,13 @@
                   <a:schemeClr val="tx1"/>
                 </a:solidFill>
               </a:rPr>
-              <a:t>Item 2</a:t>
-            </a:r>
-          </a:p>
-          <a:p>
-            <a:pPr marL="285750" indent="-285750">
-              <a:buFont typeface="Wingdings" panose="05000000000000000000" pitchFamily="2" charset="2"/>
-              <a:buChar char="ü"/>
+              <a:t>Item</a:t>
+            </a:r>
+          </a:p>
+          <a:p>
+            <a:pPr marL="342900" indent="-342900">
+              <a:buFont typeface="+mj-lt"/>
+              <a:buAutoNum type="arabicPeriod"/>
             </a:pPr>
             <a:r>
               <a:rPr lang="en-US" dirty="0">
@@ -4085,13 +4085,13 @@
                   <a:schemeClr val="tx1"/>
                 </a:solidFill>
               </a:rPr>
-              <a:t>Item 3</a:t>
-            </a:r>
-          </a:p>
-          <a:p>
-            <a:pPr marL="285750" indent="-285750">
-              <a:buFont typeface="Wingdings" panose="05000000000000000000" pitchFamily="2" charset="2"/>
-              <a:buChar char="ü"/>
+              <a:t>Item</a:t>
+            </a:r>
+          </a:p>
+          <a:p>
+            <a:pPr marL="342900" indent="-342900">
+              <a:buFont typeface="+mj-lt"/>
+              <a:buAutoNum type="arabicPeriod"/>
             </a:pPr>
             <a:r>
               <a:rPr lang="en-US" dirty="0">
@@ -4099,13 +4099,13 @@
                   <a:schemeClr val="tx1"/>
                 </a:solidFill>
               </a:rPr>
-              <a:t>Item 4</a:t>
-            </a:r>
-          </a:p>
-          <a:p>
-            <a:pPr marL="285750" indent="-285750">
-              <a:buFont typeface="Wingdings" panose="05000000000000000000" pitchFamily="2" charset="2"/>
-              <a:buChar char="ü"/>
+              <a:t>Item</a:t>
+            </a:r>
+          </a:p>
+          <a:p>
+            <a:pPr marL="342900" indent="-342900">
+              <a:buFont typeface="+mj-lt"/>
+              <a:buAutoNum type="arabicPeriod"/>
             </a:pPr>
             <a:r>
               <a:rPr lang="en-US" dirty="0">
@@ -4113,13 +4113,13 @@
                   <a:schemeClr val="tx1"/>
                 </a:solidFill>
               </a:rPr>
-              <a:t>Item 5</a:t>
-            </a:r>
-          </a:p>
-          <a:p>
-            <a:pPr marL="285750" indent="-285750">
-              <a:buFont typeface="Wingdings" panose="05000000000000000000" pitchFamily="2" charset="2"/>
-              <a:buChar char="ü"/>
+              <a:t>Item</a:t>
+            </a:r>
+          </a:p>
+          <a:p>
+            <a:pPr marL="342900" indent="-342900">
+              <a:buFont typeface="+mj-lt"/>
+              <a:buAutoNum type="arabicPeriod"/>
             </a:pPr>
             <a:r>
               <a:rPr lang="en-US" dirty="0">
@@ -4127,13 +4127,13 @@
                   <a:schemeClr val="tx1"/>
                 </a:solidFill>
               </a:rPr>
-              <a:t>Item 6</a:t>
-            </a:r>
-          </a:p>
-          <a:p>
-            <a:pPr marL="285750" indent="-285750">
-              <a:buFont typeface="Wingdings" panose="05000000000000000000" pitchFamily="2" charset="2"/>
-              <a:buChar char="ü"/>
+              <a:t>Item</a:t>
+            </a:r>
+          </a:p>
+          <a:p>
+            <a:pPr marL="342900" indent="-342900">
+              <a:buFont typeface="+mj-lt"/>
+              <a:buAutoNum type="arabicPeriod"/>
             </a:pPr>
             <a:r>
               <a:rPr lang="en-US" dirty="0">
@@ -4141,13 +4141,13 @@
                   <a:schemeClr val="tx1"/>
                 </a:solidFill>
               </a:rPr>
-              <a:t>Item 7</a:t>
-            </a:r>
-          </a:p>
-          <a:p>
-            <a:pPr marL="285750" indent="-285750">
-              <a:buFont typeface="Wingdings" panose="05000000000000000000" pitchFamily="2" charset="2"/>
-              <a:buChar char="ü"/>
+              <a:t>Item</a:t>
+            </a:r>
+          </a:p>
+          <a:p>
+            <a:pPr marL="342900" indent="-342900">
+              <a:buFont typeface="+mj-lt"/>
+              <a:buAutoNum type="arabicPeriod"/>
             </a:pPr>
             <a:r>
               <a:rPr lang="en-US" dirty="0">
@@ -4155,13 +4155,13 @@
                   <a:schemeClr val="tx1"/>
                 </a:solidFill>
               </a:rPr>
-              <a:t>Item 8</a:t>
-            </a:r>
-          </a:p>
-          <a:p>
-            <a:pPr marL="285750" indent="-285750">
-              <a:buFont typeface="Wingdings" panose="05000000000000000000" pitchFamily="2" charset="2"/>
-              <a:buChar char="ü"/>
+              <a:t>Item</a:t>
+            </a:r>
+          </a:p>
+          <a:p>
+            <a:pPr marL="342900" indent="-342900">
+              <a:buFont typeface="+mj-lt"/>
+              <a:buAutoNum type="arabicPeriod"/>
             </a:pPr>
             <a:r>
               <a:rPr lang="en-US" dirty="0">
@@ -4169,13 +4169,13 @@
                   <a:schemeClr val="tx1"/>
                 </a:solidFill>
               </a:rPr>
-              <a:t>Item 9</a:t>
-            </a:r>
-          </a:p>
-          <a:p>
-            <a:pPr marL="285750" indent="-285750">
-              <a:buFont typeface="Wingdings" panose="05000000000000000000" pitchFamily="2" charset="2"/>
-              <a:buChar char="ü"/>
+              <a:t>Item</a:t>
+            </a:r>
+          </a:p>
+          <a:p>
+            <a:pPr marL="342900" indent="-342900">
+              <a:buFont typeface="+mj-lt"/>
+              <a:buAutoNum type="arabicPeriod"/>
             </a:pPr>
             <a:r>
               <a:rPr lang="en-US" dirty="0">
@@ -4183,19 +4183,8 @@
                   <a:schemeClr val="tx1"/>
                 </a:solidFill>
               </a:rPr>
-              <a:t>Item 10 (max)</a:t>
-            </a:r>
-          </a:p>
-          <a:p>
-            <a:pPr marL="285750" indent="-285750">
-              <a:buFont typeface="Arial" panose="020B0604020202020204" pitchFamily="34" charset="0"/>
-              <a:buChar char="•"/>
-            </a:pPr>
-            <a:endParaRPr lang="en-US" dirty="0">
-              <a:solidFill>
-                <a:schemeClr val="tx1"/>
-              </a:solidFill>
-            </a:endParaRPr>
+              <a:t>Item (max)</a:t>
+            </a:r>
           </a:p>
         </p:txBody>
       </p:sp>
@@ -4248,9 +4237,9 @@
           <a:bodyPr rtlCol="0" anchor="t" anchorCtr="0"/>
           <a:lstStyle/>
           <a:p>
-            <a:pPr marL="285750" indent="-285750">
-              <a:buFont typeface="Wingdings" panose="05000000000000000000" pitchFamily="2" charset="2"/>
-              <a:buChar char="ü"/>
+            <a:pPr marL="342900" indent="-342900">
+              <a:buFont typeface="+mj-lt"/>
+              <a:buAutoNum type="arabicPeriod"/>
             </a:pPr>
             <a:r>
               <a:rPr lang="en-US" dirty="0">
@@ -4258,13 +4247,13 @@
                   <a:schemeClr val="tx1"/>
                 </a:solidFill>
               </a:rPr>
-              <a:t>Item 1</a:t>
-            </a:r>
-          </a:p>
-          <a:p>
-            <a:pPr marL="285750" indent="-285750">
-              <a:buFont typeface="Wingdings" panose="05000000000000000000" pitchFamily="2" charset="2"/>
-              <a:buChar char="ü"/>
+              <a:t>Item</a:t>
+            </a:r>
+          </a:p>
+          <a:p>
+            <a:pPr marL="342900" indent="-342900">
+              <a:buFont typeface="+mj-lt"/>
+              <a:buAutoNum type="arabicPeriod"/>
             </a:pPr>
             <a:r>
               <a:rPr lang="en-US" dirty="0">
@@ -4272,13 +4261,13 @@
                   <a:schemeClr val="tx1"/>
                 </a:solidFill>
               </a:rPr>
-              <a:t>Item 2</a:t>
-            </a:r>
-          </a:p>
-          <a:p>
-            <a:pPr marL="285750" indent="-285750">
-              <a:buFont typeface="Wingdings" panose="05000000000000000000" pitchFamily="2" charset="2"/>
-              <a:buChar char="ü"/>
+              <a:t>Item</a:t>
+            </a:r>
+          </a:p>
+          <a:p>
+            <a:pPr marL="342900" indent="-342900">
+              <a:buFont typeface="+mj-lt"/>
+              <a:buAutoNum type="arabicPeriod"/>
             </a:pPr>
             <a:r>
               <a:rPr lang="en-US" dirty="0">
@@ -4286,13 +4275,13 @@
                   <a:schemeClr val="tx1"/>
                 </a:solidFill>
               </a:rPr>
-              <a:t>Item 3</a:t>
-            </a:r>
-          </a:p>
-          <a:p>
-            <a:pPr marL="285750" indent="-285750">
-              <a:buFont typeface="Wingdings" panose="05000000000000000000" pitchFamily="2" charset="2"/>
-              <a:buChar char="ü"/>
+              <a:t>Item</a:t>
+            </a:r>
+          </a:p>
+          <a:p>
+            <a:pPr marL="342900" indent="-342900">
+              <a:buFont typeface="+mj-lt"/>
+              <a:buAutoNum type="arabicPeriod"/>
             </a:pPr>
             <a:r>
               <a:rPr lang="en-US" dirty="0">
@@ -4300,13 +4289,13 @@
                   <a:schemeClr val="tx1"/>
                 </a:solidFill>
               </a:rPr>
-              <a:t>Item 4</a:t>
-            </a:r>
-          </a:p>
-          <a:p>
-            <a:pPr marL="285750" indent="-285750">
-              <a:buFont typeface="Wingdings" panose="05000000000000000000" pitchFamily="2" charset="2"/>
-              <a:buChar char="ü"/>
+              <a:t>Item</a:t>
+            </a:r>
+          </a:p>
+          <a:p>
+            <a:pPr marL="342900" indent="-342900">
+              <a:buFont typeface="+mj-lt"/>
+              <a:buAutoNum type="arabicPeriod"/>
             </a:pPr>
             <a:r>
               <a:rPr lang="en-US" dirty="0">
@@ -4314,13 +4303,13 @@
                   <a:schemeClr val="tx1"/>
                 </a:solidFill>
               </a:rPr>
-              <a:t>Item 5</a:t>
-            </a:r>
-          </a:p>
-          <a:p>
-            <a:pPr marL="285750" indent="-285750">
-              <a:buFont typeface="Wingdings" panose="05000000000000000000" pitchFamily="2" charset="2"/>
-              <a:buChar char="ü"/>
+              <a:t>Item</a:t>
+            </a:r>
+          </a:p>
+          <a:p>
+            <a:pPr marL="342900" indent="-342900">
+              <a:buFont typeface="+mj-lt"/>
+              <a:buAutoNum type="arabicPeriod"/>
             </a:pPr>
             <a:r>
               <a:rPr lang="en-US" dirty="0">
@@ -4328,13 +4317,13 @@
                   <a:schemeClr val="tx1"/>
                 </a:solidFill>
               </a:rPr>
-              <a:t>Item 6</a:t>
-            </a:r>
-          </a:p>
-          <a:p>
-            <a:pPr marL="285750" indent="-285750">
-              <a:buFont typeface="Wingdings" panose="05000000000000000000" pitchFamily="2" charset="2"/>
-              <a:buChar char="ü"/>
+              <a:t>Item</a:t>
+            </a:r>
+          </a:p>
+          <a:p>
+            <a:pPr marL="342900" indent="-342900">
+              <a:buFont typeface="+mj-lt"/>
+              <a:buAutoNum type="arabicPeriod"/>
             </a:pPr>
             <a:r>
               <a:rPr lang="en-US" dirty="0">
@@ -4342,13 +4331,13 @@
                   <a:schemeClr val="tx1"/>
                 </a:solidFill>
               </a:rPr>
-              <a:t>Item 7</a:t>
-            </a:r>
-          </a:p>
-          <a:p>
-            <a:pPr marL="285750" indent="-285750">
-              <a:buFont typeface="Wingdings" panose="05000000000000000000" pitchFamily="2" charset="2"/>
-              <a:buChar char="ü"/>
+              <a:t>Item</a:t>
+            </a:r>
+          </a:p>
+          <a:p>
+            <a:pPr marL="342900" indent="-342900">
+              <a:buFont typeface="+mj-lt"/>
+              <a:buAutoNum type="arabicPeriod"/>
             </a:pPr>
             <a:r>
               <a:rPr lang="en-US" dirty="0">
@@ -4356,13 +4345,13 @@
                   <a:schemeClr val="tx1"/>
                 </a:solidFill>
               </a:rPr>
-              <a:t>Item 8</a:t>
-            </a:r>
-          </a:p>
-          <a:p>
-            <a:pPr marL="285750" indent="-285750">
-              <a:buFont typeface="Wingdings" panose="05000000000000000000" pitchFamily="2" charset="2"/>
-              <a:buChar char="ü"/>
+              <a:t>Item</a:t>
+            </a:r>
+          </a:p>
+          <a:p>
+            <a:pPr marL="342900" indent="-342900">
+              <a:buFont typeface="+mj-lt"/>
+              <a:buAutoNum type="arabicPeriod"/>
             </a:pPr>
             <a:r>
               <a:rPr lang="en-US" dirty="0">
@@ -4370,13 +4359,13 @@
                   <a:schemeClr val="tx1"/>
                 </a:solidFill>
               </a:rPr>
-              <a:t>Item 9</a:t>
-            </a:r>
-          </a:p>
-          <a:p>
-            <a:pPr marL="285750" indent="-285750">
-              <a:buFont typeface="Wingdings" panose="05000000000000000000" pitchFamily="2" charset="2"/>
-              <a:buChar char="ü"/>
+              <a:t>Item</a:t>
+            </a:r>
+          </a:p>
+          <a:p>
+            <a:pPr marL="342900" indent="-342900">
+              <a:buFont typeface="+mj-lt"/>
+              <a:buAutoNum type="arabicPeriod"/>
             </a:pPr>
             <a:r>
               <a:rPr lang="en-US" dirty="0">
@@ -4384,7 +4373,7 @@
                   <a:schemeClr val="tx1"/>
                 </a:solidFill>
               </a:rPr>
-              <a:t>Item 10 (max)</a:t>
+              <a:t>Item (max)</a:t>
             </a:r>
           </a:p>
         </p:txBody>
@@ -4438,9 +4427,9 @@
           <a:bodyPr rtlCol="0" anchor="t" anchorCtr="0"/>
           <a:lstStyle/>
           <a:p>
-            <a:pPr marL="285750" indent="-285750">
-              <a:buFont typeface="Wingdings" panose="05000000000000000000" pitchFamily="2" charset="2"/>
-              <a:buChar char="ü"/>
+            <a:pPr marL="342900" indent="-342900">
+              <a:buFont typeface="+mj-lt"/>
+              <a:buAutoNum type="arabicPeriod"/>
             </a:pPr>
             <a:r>
               <a:rPr lang="en-US" dirty="0">
@@ -4448,13 +4437,13 @@
                   <a:schemeClr val="tx1"/>
                 </a:solidFill>
               </a:rPr>
-              <a:t>Item 1</a:t>
-            </a:r>
-          </a:p>
-          <a:p>
-            <a:pPr marL="285750" indent="-285750">
-              <a:buFont typeface="Wingdings" panose="05000000000000000000" pitchFamily="2" charset="2"/>
-              <a:buChar char="ü"/>
+              <a:t>Item</a:t>
+            </a:r>
+          </a:p>
+          <a:p>
+            <a:pPr marL="342900" indent="-342900">
+              <a:buFont typeface="+mj-lt"/>
+              <a:buAutoNum type="arabicPeriod"/>
             </a:pPr>
             <a:r>
               <a:rPr lang="en-US" dirty="0">
@@ -4462,13 +4451,13 @@
                   <a:schemeClr val="tx1"/>
                 </a:solidFill>
               </a:rPr>
-              <a:t>Item 2</a:t>
-            </a:r>
-          </a:p>
-          <a:p>
-            <a:pPr marL="285750" indent="-285750">
-              <a:buFont typeface="Wingdings" panose="05000000000000000000" pitchFamily="2" charset="2"/>
-              <a:buChar char="ü"/>
+              <a:t>Item</a:t>
+            </a:r>
+          </a:p>
+          <a:p>
+            <a:pPr marL="342900" indent="-342900">
+              <a:buFont typeface="+mj-lt"/>
+              <a:buAutoNum type="arabicPeriod"/>
             </a:pPr>
             <a:r>
               <a:rPr lang="en-US" dirty="0">
@@ -4476,13 +4465,13 @@
                   <a:schemeClr val="tx1"/>
                 </a:solidFill>
               </a:rPr>
-              <a:t>Item 3</a:t>
-            </a:r>
-          </a:p>
-          <a:p>
-            <a:pPr marL="285750" indent="-285750">
-              <a:buFont typeface="Wingdings" panose="05000000000000000000" pitchFamily="2" charset="2"/>
-              <a:buChar char="ü"/>
+              <a:t>Item</a:t>
+            </a:r>
+          </a:p>
+          <a:p>
+            <a:pPr marL="342900" indent="-342900">
+              <a:buFont typeface="+mj-lt"/>
+              <a:buAutoNum type="arabicPeriod"/>
             </a:pPr>
             <a:r>
               <a:rPr lang="en-US" dirty="0">
@@ -4490,13 +4479,13 @@
                   <a:schemeClr val="tx1"/>
                 </a:solidFill>
               </a:rPr>
-              <a:t>Item 4</a:t>
-            </a:r>
-          </a:p>
-          <a:p>
-            <a:pPr marL="285750" indent="-285750">
-              <a:buFont typeface="Wingdings" panose="05000000000000000000" pitchFamily="2" charset="2"/>
-              <a:buChar char="ü"/>
+              <a:t>Item</a:t>
+            </a:r>
+          </a:p>
+          <a:p>
+            <a:pPr marL="342900" indent="-342900">
+              <a:buFont typeface="+mj-lt"/>
+              <a:buAutoNum type="arabicPeriod"/>
             </a:pPr>
             <a:r>
               <a:rPr lang="en-US" dirty="0">
@@ -4504,13 +4493,13 @@
                   <a:schemeClr val="tx1"/>
                 </a:solidFill>
               </a:rPr>
-              <a:t>Item 5</a:t>
-            </a:r>
-          </a:p>
-          <a:p>
-            <a:pPr marL="285750" indent="-285750">
-              <a:buFont typeface="Wingdings" panose="05000000000000000000" pitchFamily="2" charset="2"/>
-              <a:buChar char="ü"/>
+              <a:t>Item</a:t>
+            </a:r>
+          </a:p>
+          <a:p>
+            <a:pPr marL="342900" indent="-342900">
+              <a:buFont typeface="+mj-lt"/>
+              <a:buAutoNum type="arabicPeriod"/>
             </a:pPr>
             <a:r>
               <a:rPr lang="en-US" dirty="0">
@@ -4518,13 +4507,13 @@
                   <a:schemeClr val="tx1"/>
                 </a:solidFill>
               </a:rPr>
-              <a:t>Item 6</a:t>
-            </a:r>
-          </a:p>
-          <a:p>
-            <a:pPr marL="285750" indent="-285750">
-              <a:buFont typeface="Wingdings" panose="05000000000000000000" pitchFamily="2" charset="2"/>
-              <a:buChar char="ü"/>
+              <a:t>Item</a:t>
+            </a:r>
+          </a:p>
+          <a:p>
+            <a:pPr marL="342900" indent="-342900">
+              <a:buFont typeface="+mj-lt"/>
+              <a:buAutoNum type="arabicPeriod"/>
             </a:pPr>
             <a:r>
               <a:rPr lang="en-US" dirty="0">
@@ -4532,13 +4521,13 @@
                   <a:schemeClr val="tx1"/>
                 </a:solidFill>
               </a:rPr>
-              <a:t>Item 7</a:t>
-            </a:r>
-          </a:p>
-          <a:p>
-            <a:pPr marL="285750" indent="-285750">
-              <a:buFont typeface="Wingdings" panose="05000000000000000000" pitchFamily="2" charset="2"/>
-              <a:buChar char="ü"/>
+              <a:t>Item</a:t>
+            </a:r>
+          </a:p>
+          <a:p>
+            <a:pPr marL="342900" indent="-342900">
+              <a:buFont typeface="+mj-lt"/>
+              <a:buAutoNum type="arabicPeriod"/>
             </a:pPr>
             <a:r>
               <a:rPr lang="en-US" dirty="0">
@@ -4546,13 +4535,13 @@
                   <a:schemeClr val="tx1"/>
                 </a:solidFill>
               </a:rPr>
-              <a:t>Item 8</a:t>
-            </a:r>
-          </a:p>
-          <a:p>
-            <a:pPr marL="285750" indent="-285750">
-              <a:buFont typeface="Wingdings" panose="05000000000000000000" pitchFamily="2" charset="2"/>
-              <a:buChar char="ü"/>
+              <a:t>Item</a:t>
+            </a:r>
+          </a:p>
+          <a:p>
+            <a:pPr marL="342900" indent="-342900">
+              <a:buFont typeface="+mj-lt"/>
+              <a:buAutoNum type="arabicPeriod"/>
             </a:pPr>
             <a:r>
               <a:rPr lang="en-US" dirty="0">
@@ -4560,13 +4549,13 @@
                   <a:schemeClr val="tx1"/>
                 </a:solidFill>
               </a:rPr>
-              <a:t>Item 9</a:t>
-            </a:r>
-          </a:p>
-          <a:p>
-            <a:pPr marL="285750" indent="-285750">
-              <a:buFont typeface="Wingdings" panose="05000000000000000000" pitchFamily="2" charset="2"/>
-              <a:buChar char="ü"/>
+              <a:t>Item</a:t>
+            </a:r>
+          </a:p>
+          <a:p>
+            <a:pPr marL="342900" indent="-342900">
+              <a:buFont typeface="+mj-lt"/>
+              <a:buAutoNum type="arabicPeriod"/>
             </a:pPr>
             <a:r>
               <a:rPr lang="en-US" dirty="0">
@@ -4574,7 +4563,7 @@
                   <a:schemeClr val="tx1"/>
                 </a:solidFill>
               </a:rPr>
-              <a:t>Item 10 (max)</a:t>
+              <a:t>Item (max)</a:t>
             </a:r>
           </a:p>
         </p:txBody>
@@ -4628,9 +4617,9 @@
           <a:bodyPr rtlCol="0" anchor="t" anchorCtr="0"/>
           <a:lstStyle/>
           <a:p>
-            <a:pPr marL="285750" indent="-285750">
-              <a:buFont typeface="Wingdings" panose="05000000000000000000" pitchFamily="2" charset="2"/>
-              <a:buChar char="ü"/>
+            <a:pPr marL="342900" indent="-342900">
+              <a:buFont typeface="+mj-lt"/>
+              <a:buAutoNum type="arabicPeriod"/>
             </a:pPr>
             <a:r>
               <a:rPr lang="en-US" dirty="0">
@@ -4638,13 +4627,13 @@
                   <a:schemeClr val="tx1"/>
                 </a:solidFill>
               </a:rPr>
-              <a:t>Item 1</a:t>
-            </a:r>
-          </a:p>
-          <a:p>
-            <a:pPr marL="285750" indent="-285750">
-              <a:buFont typeface="Wingdings" panose="05000000000000000000" pitchFamily="2" charset="2"/>
-              <a:buChar char="ü"/>
+              <a:t>Item</a:t>
+            </a:r>
+          </a:p>
+          <a:p>
+            <a:pPr marL="342900" indent="-342900">
+              <a:buFont typeface="+mj-lt"/>
+              <a:buAutoNum type="arabicPeriod"/>
             </a:pPr>
             <a:r>
               <a:rPr lang="en-US" dirty="0">
@@ -4652,13 +4641,13 @@
                   <a:schemeClr val="tx1"/>
                 </a:solidFill>
               </a:rPr>
-              <a:t>Item 2</a:t>
-            </a:r>
-          </a:p>
-          <a:p>
-            <a:pPr marL="285750" indent="-285750">
-              <a:buFont typeface="Wingdings" panose="05000000000000000000" pitchFamily="2" charset="2"/>
-              <a:buChar char="ü"/>
+              <a:t>Item</a:t>
+            </a:r>
+          </a:p>
+          <a:p>
+            <a:pPr marL="342900" indent="-342900">
+              <a:buFont typeface="+mj-lt"/>
+              <a:buAutoNum type="arabicPeriod"/>
             </a:pPr>
             <a:r>
               <a:rPr lang="en-US" dirty="0">
@@ -4666,13 +4655,13 @@
                   <a:schemeClr val="tx1"/>
                 </a:solidFill>
               </a:rPr>
-              <a:t>Item 3</a:t>
-            </a:r>
-          </a:p>
-          <a:p>
-            <a:pPr marL="285750" indent="-285750">
-              <a:buFont typeface="Wingdings" panose="05000000000000000000" pitchFamily="2" charset="2"/>
-              <a:buChar char="ü"/>
+              <a:t>Item</a:t>
+            </a:r>
+          </a:p>
+          <a:p>
+            <a:pPr marL="342900" indent="-342900">
+              <a:buFont typeface="+mj-lt"/>
+              <a:buAutoNum type="arabicPeriod"/>
             </a:pPr>
             <a:r>
               <a:rPr lang="en-US" dirty="0">
@@ -4680,13 +4669,13 @@
                   <a:schemeClr val="tx1"/>
                 </a:solidFill>
               </a:rPr>
-              <a:t>Item 4</a:t>
-            </a:r>
-          </a:p>
-          <a:p>
-            <a:pPr marL="285750" indent="-285750">
-              <a:buFont typeface="Wingdings" panose="05000000000000000000" pitchFamily="2" charset="2"/>
-              <a:buChar char="ü"/>
+              <a:t>Item</a:t>
+            </a:r>
+          </a:p>
+          <a:p>
+            <a:pPr marL="342900" indent="-342900">
+              <a:buFont typeface="+mj-lt"/>
+              <a:buAutoNum type="arabicPeriod"/>
             </a:pPr>
             <a:r>
               <a:rPr lang="en-US" dirty="0">
@@ -4694,13 +4683,13 @@
                   <a:schemeClr val="tx1"/>
                 </a:solidFill>
               </a:rPr>
-              <a:t>Item 5</a:t>
-            </a:r>
-          </a:p>
-          <a:p>
-            <a:pPr marL="285750" indent="-285750">
-              <a:buFont typeface="Wingdings" panose="05000000000000000000" pitchFamily="2" charset="2"/>
-              <a:buChar char="ü"/>
+              <a:t>Item</a:t>
+            </a:r>
+          </a:p>
+          <a:p>
+            <a:pPr marL="342900" indent="-342900">
+              <a:buFont typeface="+mj-lt"/>
+              <a:buAutoNum type="arabicPeriod"/>
             </a:pPr>
             <a:r>
               <a:rPr lang="en-US" dirty="0">
@@ -4708,13 +4697,13 @@
                   <a:schemeClr val="tx1"/>
                 </a:solidFill>
               </a:rPr>
-              <a:t>Item 6</a:t>
-            </a:r>
-          </a:p>
-          <a:p>
-            <a:pPr marL="285750" indent="-285750">
-              <a:buFont typeface="Wingdings" panose="05000000000000000000" pitchFamily="2" charset="2"/>
-              <a:buChar char="ü"/>
+              <a:t>Item</a:t>
+            </a:r>
+          </a:p>
+          <a:p>
+            <a:pPr marL="342900" indent="-342900">
+              <a:buFont typeface="+mj-lt"/>
+              <a:buAutoNum type="arabicPeriod"/>
             </a:pPr>
             <a:r>
               <a:rPr lang="en-US" dirty="0">
@@ -4722,13 +4711,13 @@
                   <a:schemeClr val="tx1"/>
                 </a:solidFill>
               </a:rPr>
-              <a:t>Item 7</a:t>
-            </a:r>
-          </a:p>
-          <a:p>
-            <a:pPr marL="285750" indent="-285750">
-              <a:buFont typeface="Wingdings" panose="05000000000000000000" pitchFamily="2" charset="2"/>
-              <a:buChar char="ü"/>
+              <a:t>Item</a:t>
+            </a:r>
+          </a:p>
+          <a:p>
+            <a:pPr marL="342900" indent="-342900">
+              <a:buFont typeface="+mj-lt"/>
+              <a:buAutoNum type="arabicPeriod"/>
             </a:pPr>
             <a:r>
               <a:rPr lang="en-US" dirty="0">
@@ -4736,13 +4725,13 @@
                   <a:schemeClr val="tx1"/>
                 </a:solidFill>
               </a:rPr>
-              <a:t>Item 8</a:t>
-            </a:r>
-          </a:p>
-          <a:p>
-            <a:pPr marL="285750" indent="-285750">
-              <a:buFont typeface="Wingdings" panose="05000000000000000000" pitchFamily="2" charset="2"/>
-              <a:buChar char="ü"/>
+              <a:t>Item</a:t>
+            </a:r>
+          </a:p>
+          <a:p>
+            <a:pPr marL="342900" indent="-342900">
+              <a:buFont typeface="+mj-lt"/>
+              <a:buAutoNum type="arabicPeriod"/>
             </a:pPr>
             <a:r>
               <a:rPr lang="en-US" dirty="0">
@@ -4750,22 +4739,27 @@
                   <a:schemeClr val="tx1"/>
                 </a:solidFill>
               </a:rPr>
-              <a:t>Item 9</a:t>
-            </a:r>
-          </a:p>
-          <a:p>
-            <a:pPr marL="285750" indent="-285750">
-              <a:buFont typeface="Wingdings" panose="05000000000000000000" pitchFamily="2" charset="2"/>
-              <a:buChar char="ü"/>
+              <a:t>Item</a:t>
+            </a:r>
+          </a:p>
+          <a:p>
+            <a:pPr marL="342900" indent="-342900">
+              <a:buFont typeface="+mj-lt"/>
+              <a:buAutoNum type="arabicPeriod"/>
             </a:pPr>
             <a:r>
-              <a:rPr lang="en-US" dirty="0">
+              <a:rPr lang="en-US">
                 <a:solidFill>
                   <a:schemeClr val="tx1"/>
                 </a:solidFill>
               </a:rPr>
-              <a:t>Item 10 (max)</a:t>
-            </a:r>
+              <a:t>Item (max)</a:t>
+            </a:r>
+            <a:endParaRPr lang="en-US" dirty="0">
+              <a:solidFill>
+                <a:schemeClr val="tx1"/>
+              </a:solidFill>
+            </a:endParaRPr>
           </a:p>
         </p:txBody>
       </p:sp>
@@ -4877,9 +4871,9 @@
           <a:bodyPr rtlCol="0" anchor="t" anchorCtr="0"/>
           <a:lstStyle/>
           <a:p>
-            <a:pPr marL="285750" indent="-285750">
-              <a:buFont typeface="Wingdings" panose="05000000000000000000" pitchFamily="2" charset="2"/>
-              <a:buChar char="ü"/>
+            <a:pPr marL="342900" indent="-342900">
+              <a:buFont typeface="+mj-lt"/>
+              <a:buAutoNum type="arabicPeriod"/>
             </a:pPr>
             <a:r>
               <a:rPr lang="en-US" dirty="0">
@@ -4887,13 +4881,13 @@
                   <a:schemeClr val="tx1"/>
                 </a:solidFill>
               </a:rPr>
-              <a:t>Item 1</a:t>
-            </a:r>
-          </a:p>
-          <a:p>
-            <a:pPr marL="285750" indent="-285750">
-              <a:buFont typeface="Wingdings" panose="05000000000000000000" pitchFamily="2" charset="2"/>
-              <a:buChar char="ü"/>
+              <a:t>Item</a:t>
+            </a:r>
+          </a:p>
+          <a:p>
+            <a:pPr marL="342900" indent="-342900">
+              <a:buFont typeface="+mj-lt"/>
+              <a:buAutoNum type="arabicPeriod"/>
             </a:pPr>
             <a:r>
               <a:rPr lang="en-US" dirty="0">
@@ -4901,13 +4895,13 @@
                   <a:schemeClr val="tx1"/>
                 </a:solidFill>
               </a:rPr>
-              <a:t>Item 2</a:t>
-            </a:r>
-          </a:p>
-          <a:p>
-            <a:pPr marL="285750" indent="-285750">
-              <a:buFont typeface="Wingdings" panose="05000000000000000000" pitchFamily="2" charset="2"/>
-              <a:buChar char="ü"/>
+              <a:t>Item</a:t>
+            </a:r>
+          </a:p>
+          <a:p>
+            <a:pPr marL="342900" indent="-342900">
+              <a:buFont typeface="+mj-lt"/>
+              <a:buAutoNum type="arabicPeriod"/>
             </a:pPr>
             <a:r>
               <a:rPr lang="en-US" dirty="0">
@@ -4915,13 +4909,13 @@
                   <a:schemeClr val="tx1"/>
                 </a:solidFill>
               </a:rPr>
-              <a:t>Item 3</a:t>
-            </a:r>
-          </a:p>
-          <a:p>
-            <a:pPr marL="285750" indent="-285750">
-              <a:buFont typeface="Wingdings" panose="05000000000000000000" pitchFamily="2" charset="2"/>
-              <a:buChar char="ü"/>
+              <a:t>Item</a:t>
+            </a:r>
+          </a:p>
+          <a:p>
+            <a:pPr marL="342900" indent="-342900">
+              <a:buFont typeface="+mj-lt"/>
+              <a:buAutoNum type="arabicPeriod"/>
             </a:pPr>
             <a:r>
               <a:rPr lang="en-US" dirty="0">
@@ -4929,13 +4923,13 @@
                   <a:schemeClr val="tx1"/>
                 </a:solidFill>
               </a:rPr>
-              <a:t>Item 4</a:t>
-            </a:r>
-          </a:p>
-          <a:p>
-            <a:pPr marL="285750" indent="-285750">
-              <a:buFont typeface="Wingdings" panose="05000000000000000000" pitchFamily="2" charset="2"/>
-              <a:buChar char="ü"/>
+              <a:t>Item</a:t>
+            </a:r>
+          </a:p>
+          <a:p>
+            <a:pPr marL="342900" indent="-342900">
+              <a:buFont typeface="+mj-lt"/>
+              <a:buAutoNum type="arabicPeriod"/>
             </a:pPr>
             <a:r>
               <a:rPr lang="en-US" dirty="0">
@@ -4943,13 +4937,13 @@
                   <a:schemeClr val="tx1"/>
                 </a:solidFill>
               </a:rPr>
-              <a:t>Item 5</a:t>
-            </a:r>
-          </a:p>
-          <a:p>
-            <a:pPr marL="285750" indent="-285750">
-              <a:buFont typeface="Wingdings" panose="05000000000000000000" pitchFamily="2" charset="2"/>
-              <a:buChar char="ü"/>
+              <a:t>Item</a:t>
+            </a:r>
+          </a:p>
+          <a:p>
+            <a:pPr marL="342900" indent="-342900">
+              <a:buFont typeface="+mj-lt"/>
+              <a:buAutoNum type="arabicPeriod"/>
             </a:pPr>
             <a:r>
               <a:rPr lang="en-US" dirty="0">
@@ -4957,13 +4951,13 @@
                   <a:schemeClr val="tx1"/>
                 </a:solidFill>
               </a:rPr>
-              <a:t>Item 6</a:t>
-            </a:r>
-          </a:p>
-          <a:p>
-            <a:pPr marL="285750" indent="-285750">
-              <a:buFont typeface="Wingdings" panose="05000000000000000000" pitchFamily="2" charset="2"/>
-              <a:buChar char="ü"/>
+              <a:t>Item</a:t>
+            </a:r>
+          </a:p>
+          <a:p>
+            <a:pPr marL="342900" indent="-342900">
+              <a:buFont typeface="+mj-lt"/>
+              <a:buAutoNum type="arabicPeriod"/>
             </a:pPr>
             <a:r>
               <a:rPr lang="en-US" dirty="0">
@@ -4971,13 +4965,13 @@
                   <a:schemeClr val="tx1"/>
                 </a:solidFill>
               </a:rPr>
-              <a:t>Item 7</a:t>
-            </a:r>
-          </a:p>
-          <a:p>
-            <a:pPr marL="285750" indent="-285750">
-              <a:buFont typeface="Wingdings" panose="05000000000000000000" pitchFamily="2" charset="2"/>
-              <a:buChar char="ü"/>
+              <a:t>Item</a:t>
+            </a:r>
+          </a:p>
+          <a:p>
+            <a:pPr marL="342900" indent="-342900">
+              <a:buFont typeface="+mj-lt"/>
+              <a:buAutoNum type="arabicPeriod"/>
             </a:pPr>
             <a:r>
               <a:rPr lang="en-US" dirty="0">
@@ -4985,13 +4979,13 @@
                   <a:schemeClr val="tx1"/>
                 </a:solidFill>
               </a:rPr>
-              <a:t>Item 8</a:t>
-            </a:r>
-          </a:p>
-          <a:p>
-            <a:pPr marL="285750" indent="-285750">
-              <a:buFont typeface="Wingdings" panose="05000000000000000000" pitchFamily="2" charset="2"/>
-              <a:buChar char="ü"/>
+              <a:t>Item</a:t>
+            </a:r>
+          </a:p>
+          <a:p>
+            <a:pPr marL="342900" indent="-342900">
+              <a:buFont typeface="+mj-lt"/>
+              <a:buAutoNum type="arabicPeriod"/>
             </a:pPr>
             <a:r>
               <a:rPr lang="en-US" dirty="0">
@@ -4999,13 +4993,13 @@
                   <a:schemeClr val="tx1"/>
                 </a:solidFill>
               </a:rPr>
-              <a:t>Item 9</a:t>
-            </a:r>
-          </a:p>
-          <a:p>
-            <a:pPr marL="285750" indent="-285750">
-              <a:buFont typeface="Wingdings" panose="05000000000000000000" pitchFamily="2" charset="2"/>
-              <a:buChar char="ü"/>
+              <a:t>Item</a:t>
+            </a:r>
+          </a:p>
+          <a:p>
+            <a:pPr marL="342900" indent="-342900">
+              <a:buFont typeface="+mj-lt"/>
+              <a:buAutoNum type="arabicPeriod"/>
             </a:pPr>
             <a:r>
               <a:rPr lang="en-US" dirty="0">
@@ -5013,7 +5007,7 @@
                   <a:schemeClr val="tx1"/>
                 </a:solidFill>
               </a:rPr>
-              <a:t>Item 10 (max)</a:t>
+              <a:t>Item (max)</a:t>
             </a:r>
           </a:p>
         </p:txBody>

</xml_diff>

<commit_message>
extra notes/comments in read and delete functions
</commit_message>
<xml_diff>
--- a/extra-files/code-louisville-js-task-app.pptx
+++ b/extra-files/code-louisville-js-task-app.pptx
@@ -197,7 +197,7 @@
           <a:p>
             <a:fld id="{17F58322-1471-4DFD-BB86-A7875EB5428B}" type="datetimeFigureOut">
               <a:rPr lang="en-US" smtClean="0"/>
-              <a:t>10/25/2021</a:t>
+              <a:t>10/26/2021</a:t>
             </a:fld>
             <a:endParaRPr lang="en-US"/>
           </a:p>
@@ -695,7 +695,7 @@
           <a:p>
             <a:fld id="{3B0D9B70-C420-4220-BB97-72DD33D740D8}" type="datetimeFigureOut">
               <a:rPr lang="en-US" smtClean="0"/>
-              <a:t>10/25/2021</a:t>
+              <a:t>10/26/2021</a:t>
             </a:fld>
             <a:endParaRPr lang="en-US"/>
           </a:p>
@@ -893,7 +893,7 @@
           <a:p>
             <a:fld id="{3B0D9B70-C420-4220-BB97-72DD33D740D8}" type="datetimeFigureOut">
               <a:rPr lang="en-US" smtClean="0"/>
-              <a:t>10/25/2021</a:t>
+              <a:t>10/26/2021</a:t>
             </a:fld>
             <a:endParaRPr lang="en-US"/>
           </a:p>
@@ -1101,7 +1101,7 @@
           <a:p>
             <a:fld id="{3B0D9B70-C420-4220-BB97-72DD33D740D8}" type="datetimeFigureOut">
               <a:rPr lang="en-US" smtClean="0"/>
-              <a:t>10/25/2021</a:t>
+              <a:t>10/26/2021</a:t>
             </a:fld>
             <a:endParaRPr lang="en-US"/>
           </a:p>
@@ -1299,7 +1299,7 @@
           <a:p>
             <a:fld id="{3B0D9B70-C420-4220-BB97-72DD33D740D8}" type="datetimeFigureOut">
               <a:rPr lang="en-US" smtClean="0"/>
-              <a:t>10/25/2021</a:t>
+              <a:t>10/26/2021</a:t>
             </a:fld>
             <a:endParaRPr lang="en-US"/>
           </a:p>
@@ -1574,7 +1574,7 @@
           <a:p>
             <a:fld id="{3B0D9B70-C420-4220-BB97-72DD33D740D8}" type="datetimeFigureOut">
               <a:rPr lang="en-US" smtClean="0"/>
-              <a:t>10/25/2021</a:t>
+              <a:t>10/26/2021</a:t>
             </a:fld>
             <a:endParaRPr lang="en-US"/>
           </a:p>
@@ -1839,7 +1839,7 @@
           <a:p>
             <a:fld id="{3B0D9B70-C420-4220-BB97-72DD33D740D8}" type="datetimeFigureOut">
               <a:rPr lang="en-US" smtClean="0"/>
-              <a:t>10/25/2021</a:t>
+              <a:t>10/26/2021</a:t>
             </a:fld>
             <a:endParaRPr lang="en-US"/>
           </a:p>
@@ -2251,7 +2251,7 @@
           <a:p>
             <a:fld id="{3B0D9B70-C420-4220-BB97-72DD33D740D8}" type="datetimeFigureOut">
               <a:rPr lang="en-US" smtClean="0"/>
-              <a:t>10/25/2021</a:t>
+              <a:t>10/26/2021</a:t>
             </a:fld>
             <a:endParaRPr lang="en-US"/>
           </a:p>
@@ -2392,7 +2392,7 @@
           <a:p>
             <a:fld id="{3B0D9B70-C420-4220-BB97-72DD33D740D8}" type="datetimeFigureOut">
               <a:rPr lang="en-US" smtClean="0"/>
-              <a:t>10/25/2021</a:t>
+              <a:t>10/26/2021</a:t>
             </a:fld>
             <a:endParaRPr lang="en-US"/>
           </a:p>
@@ -2505,7 +2505,7 @@
           <a:p>
             <a:fld id="{3B0D9B70-C420-4220-BB97-72DD33D740D8}" type="datetimeFigureOut">
               <a:rPr lang="en-US" smtClean="0"/>
-              <a:t>10/25/2021</a:t>
+              <a:t>10/26/2021</a:t>
             </a:fld>
             <a:endParaRPr lang="en-US"/>
           </a:p>
@@ -2816,7 +2816,7 @@
           <a:p>
             <a:fld id="{3B0D9B70-C420-4220-BB97-72DD33D740D8}" type="datetimeFigureOut">
               <a:rPr lang="en-US" smtClean="0"/>
-              <a:t>10/25/2021</a:t>
+              <a:t>10/26/2021</a:t>
             </a:fld>
             <a:endParaRPr lang="en-US"/>
           </a:p>
@@ -3104,7 +3104,7 @@
           <a:p>
             <a:fld id="{3B0D9B70-C420-4220-BB97-72DD33D740D8}" type="datetimeFigureOut">
               <a:rPr lang="en-US" smtClean="0"/>
-              <a:t>10/25/2021</a:t>
+              <a:t>10/26/2021</a:t>
             </a:fld>
             <a:endParaRPr lang="en-US"/>
           </a:p>
@@ -3345,7 +3345,7 @@
           <a:p>
             <a:fld id="{3B0D9B70-C420-4220-BB97-72DD33D740D8}" type="datetimeFigureOut">
               <a:rPr lang="en-US" smtClean="0"/>
-              <a:t>10/25/2021</a:t>
+              <a:t>10/26/2021</a:t>
             </a:fld>
             <a:endParaRPr lang="en-US"/>
           </a:p>
@@ -3776,7 +3776,7 @@
         </p:nvSpPr>
         <p:spPr>
           <a:xfrm>
-            <a:off x="5518003" y="1465715"/>
+            <a:off x="5518003" y="2644275"/>
             <a:ext cx="1992004" cy="621437"/>
           </a:xfrm>
           <a:prstGeom prst="roundRect">
@@ -3816,7 +3816,7 @@
                   <a:schemeClr val="tx1"/>
                 </a:solidFill>
               </a:rPr>
-              <a:t>Important Task</a:t>
+              <a:t>Important</a:t>
             </a:r>
           </a:p>
         </p:txBody>
@@ -3835,7 +3835,7 @@
         </p:nvSpPr>
         <p:spPr>
           <a:xfrm>
-            <a:off x="3477040" y="1465715"/>
+            <a:off x="3477040" y="2644275"/>
             <a:ext cx="1992004" cy="621437"/>
           </a:xfrm>
           <a:prstGeom prst="roundRect">
@@ -3875,7 +3875,7 @@
                   <a:schemeClr val="tx1"/>
                 </a:solidFill>
               </a:rPr>
-              <a:t>Urgent Task</a:t>
+              <a:t>Urgent</a:t>
             </a:r>
           </a:p>
         </p:txBody>
@@ -3894,7 +3894,7 @@
         </p:nvSpPr>
         <p:spPr>
           <a:xfrm>
-            <a:off x="7558965" y="1465715"/>
+            <a:off x="7558965" y="2644275"/>
             <a:ext cx="1992004" cy="621437"/>
           </a:xfrm>
           <a:prstGeom prst="roundRect">
@@ -3934,7 +3934,7 @@
                   <a:schemeClr val="tx1"/>
                 </a:solidFill>
               </a:rPr>
-              <a:t>Fun Task</a:t>
+              <a:t>Fun</a:t>
             </a:r>
           </a:p>
         </p:txBody>
@@ -3953,7 +3953,7 @@
         </p:nvSpPr>
         <p:spPr>
           <a:xfrm>
-            <a:off x="9927996" y="1465715"/>
+            <a:off x="9927996" y="2644275"/>
             <a:ext cx="1992004" cy="621437"/>
           </a:xfrm>
           <a:prstGeom prst="roundRect">
@@ -4012,7 +4012,7 @@
         </p:nvSpPr>
         <p:spPr>
           <a:xfrm>
-            <a:off x="3477040" y="2140419"/>
+            <a:off x="3477040" y="3318979"/>
             <a:ext cx="1988907" cy="3230012"/>
           </a:xfrm>
           <a:prstGeom prst="roundRect">
@@ -4202,7 +4202,7 @@
         </p:nvSpPr>
         <p:spPr>
           <a:xfrm>
-            <a:off x="5521100" y="2140419"/>
+            <a:off x="5521100" y="3318979"/>
             <a:ext cx="1988907" cy="3230012"/>
           </a:xfrm>
           <a:prstGeom prst="roundRect">
@@ -4392,7 +4392,7 @@
         </p:nvSpPr>
         <p:spPr>
           <a:xfrm>
-            <a:off x="7562063" y="2140419"/>
+            <a:off x="7562063" y="3318979"/>
             <a:ext cx="1988907" cy="3230012"/>
           </a:xfrm>
           <a:prstGeom prst="roundRect">
@@ -4582,7 +4582,7 @@
         </p:nvSpPr>
         <p:spPr>
           <a:xfrm>
-            <a:off x="9931093" y="2140419"/>
+            <a:off x="9931093" y="3318979"/>
             <a:ext cx="1988907" cy="3230012"/>
           </a:xfrm>
           <a:prstGeom prst="roundRect">
@@ -4777,7 +4777,7 @@
         </p:nvSpPr>
         <p:spPr>
           <a:xfrm>
-            <a:off x="248276" y="1465715"/>
+            <a:off x="248276" y="2644275"/>
             <a:ext cx="2906404" cy="621437"/>
           </a:xfrm>
           <a:prstGeom prst="roundRect">
@@ -4817,7 +4817,7 @@
                   <a:schemeClr val="tx1"/>
                 </a:solidFill>
               </a:rPr>
-              <a:t>The Full Day</a:t>
+              <a:t>Today’s To-Do List</a:t>
             </a:r>
           </a:p>
         </p:txBody>
@@ -4836,7 +4836,7 @@
         </p:nvSpPr>
         <p:spPr>
           <a:xfrm>
-            <a:off x="252795" y="2140419"/>
+            <a:off x="252795" y="3318979"/>
             <a:ext cx="2901885" cy="3230012"/>
           </a:xfrm>
           <a:prstGeom prst="roundRect">
@@ -5188,201 +5188,383 @@
           </a:fontRef>
         </p:style>
       </p:cxnSp>
-      <p:grpSp>
-        <p:nvGrpSpPr>
-          <p:cNvPr id="28" name="Group 27">
-            <a:extLst>
-              <a:ext uri="{FF2B5EF4-FFF2-40B4-BE49-F238E27FC236}">
-                <a16:creationId xmlns:a16="http://schemas.microsoft.com/office/drawing/2014/main" id="{3455D5AA-DAD0-4F76-A20A-1817340D9C77}"/>
-              </a:ext>
-            </a:extLst>
-          </p:cNvPr>
-          <p:cNvGrpSpPr/>
+      <p:sp>
+        <p:nvSpPr>
+          <p:cNvPr id="23" name="Rectangle: Rounded Corners 22">
+            <a:extLst>
+              <a:ext uri="{FF2B5EF4-FFF2-40B4-BE49-F238E27FC236}">
+                <a16:creationId xmlns:a16="http://schemas.microsoft.com/office/drawing/2014/main" id="{1196806B-1C70-4C27-B8E2-BB32E006913D}"/>
+              </a:ext>
+            </a:extLst>
+          </p:cNvPr>
+          <p:cNvSpPr/>
           <p:nvPr/>
-        </p:nvGrpSpPr>
-        <p:grpSpPr>
+        </p:nvSpPr>
+        <p:spPr>
           <a:xfrm>
-            <a:off x="221386" y="937549"/>
-            <a:ext cx="9295476" cy="379917"/>
-            <a:chOff x="221386" y="937549"/>
-            <a:chExt cx="6894910" cy="379917"/>
+            <a:off x="221387" y="937549"/>
+            <a:ext cx="2832710" cy="379917"/>
           </a:xfrm>
-        </p:grpSpPr>
-        <p:sp>
-          <p:nvSpPr>
-            <p:cNvPr id="23" name="Rectangle: Rounded Corners 22">
-              <a:extLst>
-                <a:ext uri="{FF2B5EF4-FFF2-40B4-BE49-F238E27FC236}">
-                  <a16:creationId xmlns:a16="http://schemas.microsoft.com/office/drawing/2014/main" id="{1196806B-1C70-4C27-B8E2-BB32E006913D}"/>
-                </a:ext>
-              </a:extLst>
-            </p:cNvPr>
-            <p:cNvSpPr/>
-            <p:nvPr/>
-          </p:nvSpPr>
-          <p:spPr>
-            <a:xfrm>
-              <a:off x="221386" y="937549"/>
-              <a:ext cx="2903779" cy="379917"/>
-            </a:xfrm>
-            <a:prstGeom prst="roundRect">
-              <a:avLst/>
-            </a:prstGeom>
+          <a:prstGeom prst="roundRect">
+            <a:avLst/>
+          </a:prstGeom>
+          <a:noFill/>
+          <a:ln>
+            <a:solidFill>
+              <a:schemeClr val="tx1"/>
+            </a:solidFill>
+          </a:ln>
+        </p:spPr>
+        <p:style>
+          <a:lnRef idx="2">
+            <a:schemeClr val="accent1">
+              <a:shade val="50000"/>
+            </a:schemeClr>
+          </a:lnRef>
+          <a:fillRef idx="1">
+            <a:schemeClr val="accent1"/>
+          </a:fillRef>
+          <a:effectRef idx="0">
+            <a:schemeClr val="accent1"/>
+          </a:effectRef>
+          <a:fontRef idx="minor">
+            <a:schemeClr val="lt1"/>
+          </a:fontRef>
+        </p:style>
+        <p:txBody>
+          <a:bodyPr rtlCol="0" anchor="ctr"/>
+          <a:lstStyle/>
+          <a:p>
+            <a:r>
+              <a:rPr lang="en-US" dirty="0">
+                <a:solidFill>
+                  <a:schemeClr val="tx1"/>
+                </a:solidFill>
+              </a:rPr>
+              <a:t>Task</a:t>
+            </a:r>
+          </a:p>
+        </p:txBody>
+      </p:sp>
+      <p:sp>
+        <p:nvSpPr>
+          <p:cNvPr id="25" name="Rectangle: Rounded Corners 24">
+            <a:extLst>
+              <a:ext uri="{FF2B5EF4-FFF2-40B4-BE49-F238E27FC236}">
+                <a16:creationId xmlns:a16="http://schemas.microsoft.com/office/drawing/2014/main" id="{7A5FE538-1A93-4628-BA43-AB18A47A6A07}"/>
+              </a:ext>
+            </a:extLst>
+          </p:cNvPr>
+          <p:cNvSpPr/>
+          <p:nvPr/>
+        </p:nvSpPr>
+        <p:spPr>
+          <a:xfrm>
+            <a:off x="5903457" y="937549"/>
+            <a:ext cx="2667316" cy="379917"/>
+          </a:xfrm>
+          <a:prstGeom prst="roundRect">
+            <a:avLst/>
+          </a:prstGeom>
+          <a:noFill/>
+          <a:ln>
+            <a:solidFill>
+              <a:schemeClr val="tx1"/>
+            </a:solidFill>
+          </a:ln>
+        </p:spPr>
+        <p:style>
+          <a:lnRef idx="2">
+            <a:schemeClr val="accent1">
+              <a:shade val="50000"/>
+            </a:schemeClr>
+          </a:lnRef>
+          <a:fillRef idx="1">
+            <a:schemeClr val="accent1"/>
+          </a:fillRef>
+          <a:effectRef idx="0">
+            <a:schemeClr val="accent1"/>
+          </a:effectRef>
+          <a:fontRef idx="minor">
+            <a:schemeClr val="lt1"/>
+          </a:fontRef>
+        </p:style>
+        <p:txBody>
+          <a:bodyPr rtlCol="0" anchor="ctr"/>
+          <a:lstStyle/>
+          <a:p>
+            <a:r>
+              <a:rPr lang="en-US" dirty="0">
+                <a:solidFill>
+                  <a:schemeClr val="tx1"/>
+                </a:solidFill>
+              </a:rPr>
+              <a:t>Task Type</a:t>
+            </a:r>
+          </a:p>
+        </p:txBody>
+      </p:sp>
+      <p:sp>
+        <p:nvSpPr>
+          <p:cNvPr id="24" name="Rectangle: Rounded Corners 23">
+            <a:extLst>
+              <a:ext uri="{FF2B5EF4-FFF2-40B4-BE49-F238E27FC236}">
+                <a16:creationId xmlns:a16="http://schemas.microsoft.com/office/drawing/2014/main" id="{7E659108-64CB-4EB4-981A-74E2248701C8}"/>
+              </a:ext>
+            </a:extLst>
+          </p:cNvPr>
+          <p:cNvSpPr/>
+          <p:nvPr/>
+        </p:nvSpPr>
+        <p:spPr>
+          <a:xfrm>
+            <a:off x="3116987" y="937549"/>
+            <a:ext cx="924661" cy="379917"/>
+          </a:xfrm>
+          <a:prstGeom prst="roundRect">
+            <a:avLst/>
+          </a:prstGeom>
+          <a:noFill/>
+          <a:ln>
+            <a:solidFill>
+              <a:schemeClr val="tx1"/>
+            </a:solidFill>
+          </a:ln>
+        </p:spPr>
+        <p:style>
+          <a:lnRef idx="2">
+            <a:schemeClr val="accent1">
+              <a:shade val="50000"/>
+            </a:schemeClr>
+          </a:lnRef>
+          <a:fillRef idx="1">
+            <a:schemeClr val="accent1"/>
+          </a:fillRef>
+          <a:effectRef idx="0">
+            <a:schemeClr val="accent1"/>
+          </a:effectRef>
+          <a:fontRef idx="minor">
+            <a:schemeClr val="lt1"/>
+          </a:fontRef>
+        </p:style>
+        <p:txBody>
+          <a:bodyPr rtlCol="0" anchor="ctr"/>
+          <a:lstStyle/>
+          <a:p>
+            <a:r>
+              <a:rPr lang="en-US" dirty="0">
+                <a:solidFill>
+                  <a:schemeClr val="tx1"/>
+                </a:solidFill>
+              </a:rPr>
+              <a:t>Add</a:t>
+            </a:r>
+          </a:p>
+        </p:txBody>
+      </p:sp>
+      <p:sp>
+        <p:nvSpPr>
+          <p:cNvPr id="26" name="Rectangle: Rounded Corners 25">
+            <a:extLst>
+              <a:ext uri="{FF2B5EF4-FFF2-40B4-BE49-F238E27FC236}">
+                <a16:creationId xmlns:a16="http://schemas.microsoft.com/office/drawing/2014/main" id="{4F056AE6-179A-4A08-8419-90576921B7AD}"/>
+              </a:ext>
+            </a:extLst>
+          </p:cNvPr>
+          <p:cNvSpPr/>
+          <p:nvPr/>
+        </p:nvSpPr>
+        <p:spPr>
+          <a:xfrm>
+            <a:off x="8639838" y="937549"/>
+            <a:ext cx="924661" cy="379917"/>
+          </a:xfrm>
+          <a:prstGeom prst="roundRect">
+            <a:avLst/>
+          </a:prstGeom>
+          <a:noFill/>
+          <a:ln>
+            <a:solidFill>
+              <a:schemeClr val="tx1"/>
+            </a:solidFill>
+          </a:ln>
+        </p:spPr>
+        <p:style>
+          <a:lnRef idx="2">
+            <a:schemeClr val="accent1">
+              <a:shade val="50000"/>
+            </a:schemeClr>
+          </a:lnRef>
+          <a:fillRef idx="1">
+            <a:schemeClr val="accent1"/>
+          </a:fillRef>
+          <a:effectRef idx="0">
+            <a:schemeClr val="accent1"/>
+          </a:effectRef>
+          <a:fontRef idx="minor">
+            <a:schemeClr val="lt1"/>
+          </a:fontRef>
+        </p:style>
+        <p:txBody>
+          <a:bodyPr rtlCol="0" anchor="ctr"/>
+          <a:lstStyle/>
+          <a:p>
+            <a:r>
+              <a:rPr lang="en-US" dirty="0">
+                <a:solidFill>
+                  <a:schemeClr val="tx1"/>
+                </a:solidFill>
+              </a:rPr>
+              <a:t>Add</a:t>
+            </a:r>
+          </a:p>
+        </p:txBody>
+      </p:sp>
+      <p:pic>
+        <p:nvPicPr>
+          <p:cNvPr id="12" name="Picture 11">
+            <a:extLst>
+              <a:ext uri="{FF2B5EF4-FFF2-40B4-BE49-F238E27FC236}">
+                <a16:creationId xmlns:a16="http://schemas.microsoft.com/office/drawing/2014/main" id="{793645EA-42BD-4ACC-ADC9-00C04D22D25F}"/>
+              </a:ext>
+            </a:extLst>
+          </p:cNvPr>
+          <p:cNvPicPr>
+            <a:picLocks noChangeAspect="1"/>
+          </p:cNvPicPr>
+          <p:nvPr/>
+        </p:nvPicPr>
+        <p:blipFill rotWithShape="1">
+          <a:blip r:embed="rId3"/>
+          <a:srcRect l="36272" t="24332" r="33718" b="37988"/>
+          <a:stretch/>
+        </p:blipFill>
+        <p:spPr>
+          <a:xfrm>
+            <a:off x="9682479" y="2444621"/>
+            <a:ext cx="2690096" cy="4264089"/>
+          </a:xfrm>
+          <a:prstGeom prst="rect">
+            <a:avLst/>
+          </a:prstGeom>
+        </p:spPr>
+      </p:pic>
+      <p:sp>
+        <p:nvSpPr>
+          <p:cNvPr id="29" name="Rectangle: Rounded Corners 28">
+            <a:extLst>
+              <a:ext uri="{FF2B5EF4-FFF2-40B4-BE49-F238E27FC236}">
+                <a16:creationId xmlns:a16="http://schemas.microsoft.com/office/drawing/2014/main" id="{5CB79C78-D909-495D-BEA2-214D69E5C820}"/>
+              </a:ext>
+            </a:extLst>
+          </p:cNvPr>
+          <p:cNvSpPr/>
+          <p:nvPr/>
+        </p:nvSpPr>
+        <p:spPr>
+          <a:xfrm>
+            <a:off x="4474425" y="1642897"/>
+            <a:ext cx="1273555" cy="408623"/>
+          </a:xfrm>
+          <a:prstGeom prst="roundRect">
+            <a:avLst/>
+          </a:prstGeom>
+          <a:noFill/>
+          <a:ln>
             <a:noFill/>
-            <a:ln>
-              <a:solidFill>
-                <a:schemeClr val="tx1"/>
-              </a:solidFill>
-            </a:ln>
-          </p:spPr>
-          <p:style>
-            <a:lnRef idx="2">
-              <a:schemeClr val="accent1">
-                <a:shade val="50000"/>
-              </a:schemeClr>
-            </a:lnRef>
-            <a:fillRef idx="1">
-              <a:schemeClr val="accent1"/>
-            </a:fillRef>
-            <a:effectRef idx="0">
-              <a:schemeClr val="accent1"/>
-            </a:effectRef>
-            <a:fontRef idx="minor">
-              <a:schemeClr val="lt1"/>
-            </a:fontRef>
-          </p:style>
-          <p:txBody>
-            <a:bodyPr rtlCol="0" anchor="ctr"/>
-            <a:lstStyle/>
-            <a:p>
-              <a:r>
-                <a:rPr lang="en-US" dirty="0">
-                  <a:solidFill>
-                    <a:schemeClr val="tx1"/>
-                  </a:solidFill>
-                </a:rPr>
-                <a:t>Some text input</a:t>
-              </a:r>
-            </a:p>
-          </p:txBody>
-        </p:sp>
-        <p:sp>
-          <p:nvSpPr>
-            <p:cNvPr id="25" name="Rectangle: Rounded Corners 24">
-              <a:extLst>
-                <a:ext uri="{FF2B5EF4-FFF2-40B4-BE49-F238E27FC236}">
-                  <a16:creationId xmlns:a16="http://schemas.microsoft.com/office/drawing/2014/main" id="{7A5FE538-1A93-4628-BA43-AB18A47A6A07}"/>
-                </a:ext>
-              </a:extLst>
-            </p:cNvPr>
-            <p:cNvSpPr/>
-            <p:nvPr/>
-          </p:nvSpPr>
-          <p:spPr>
-            <a:xfrm>
-              <a:off x="3197203" y="937549"/>
-              <a:ext cx="1978479" cy="379917"/>
-            </a:xfrm>
-            <a:prstGeom prst="roundRect">
-              <a:avLst/>
-            </a:prstGeom>
+          </a:ln>
+        </p:spPr>
+        <p:style>
+          <a:lnRef idx="2">
+            <a:schemeClr val="accent1">
+              <a:shade val="50000"/>
+            </a:schemeClr>
+          </a:lnRef>
+          <a:fillRef idx="1">
+            <a:schemeClr val="accent1"/>
+          </a:fillRef>
+          <a:effectRef idx="0">
+            <a:schemeClr val="accent1"/>
+          </a:effectRef>
+          <a:fontRef idx="minor">
+            <a:schemeClr val="lt1"/>
+          </a:fontRef>
+        </p:style>
+        <p:txBody>
+          <a:bodyPr wrap="none" rtlCol="0" anchor="ctr">
+            <a:spAutoFit/>
+          </a:bodyPr>
+          <a:lstStyle/>
+          <a:p>
+            <a:r>
+              <a:rPr lang="en-US" dirty="0">
+                <a:solidFill>
+                  <a:schemeClr val="tx1"/>
+                </a:solidFill>
+              </a:rPr>
+              <a:t>Total Tasks:</a:t>
+            </a:r>
+          </a:p>
+        </p:txBody>
+      </p:sp>
+      <p:sp>
+        <p:nvSpPr>
+          <p:cNvPr id="30" name="Rectangle: Rounded Corners 29">
+            <a:extLst>
+              <a:ext uri="{FF2B5EF4-FFF2-40B4-BE49-F238E27FC236}">
+                <a16:creationId xmlns:a16="http://schemas.microsoft.com/office/drawing/2014/main" id="{C19B3BF6-9048-4AF9-B4EC-273E5FA828E1}"/>
+              </a:ext>
+            </a:extLst>
+          </p:cNvPr>
+          <p:cNvSpPr/>
+          <p:nvPr/>
+        </p:nvSpPr>
+        <p:spPr>
+          <a:xfrm>
+            <a:off x="5794071" y="1648255"/>
+            <a:ext cx="314270" cy="397907"/>
+          </a:xfrm>
+          <a:prstGeom prst="roundRect">
+            <a:avLst/>
+          </a:prstGeom>
+          <a:noFill/>
+          <a:ln>
             <a:noFill/>
-            <a:ln>
-              <a:solidFill>
-                <a:schemeClr val="tx1"/>
-              </a:solidFill>
-            </a:ln>
-          </p:spPr>
-          <p:style>
-            <a:lnRef idx="2">
-              <a:schemeClr val="accent1">
-                <a:shade val="50000"/>
-              </a:schemeClr>
-            </a:lnRef>
-            <a:fillRef idx="1">
-              <a:schemeClr val="accent1"/>
-            </a:fillRef>
-            <a:effectRef idx="0">
-              <a:schemeClr val="accent1"/>
-            </a:effectRef>
-            <a:fontRef idx="minor">
-              <a:schemeClr val="lt1"/>
-            </a:fontRef>
-          </p:style>
-          <p:txBody>
-            <a:bodyPr rtlCol="0" anchor="ctr"/>
-            <a:lstStyle/>
-            <a:p>
-              <a:r>
-                <a:rPr lang="en-US" dirty="0">
-                  <a:solidFill>
-                    <a:schemeClr val="tx1"/>
-                  </a:solidFill>
-                </a:rPr>
-                <a:t>Task Type Dropdown</a:t>
-              </a:r>
-            </a:p>
-          </p:txBody>
-        </p:sp>
-        <p:sp>
-          <p:nvSpPr>
-            <p:cNvPr id="27" name="Rectangle: Rounded Corners 26">
-              <a:extLst>
-                <a:ext uri="{FF2B5EF4-FFF2-40B4-BE49-F238E27FC236}">
-                  <a16:creationId xmlns:a16="http://schemas.microsoft.com/office/drawing/2014/main" id="{1E4E0351-5B2B-4BC3-B31D-DB1364A84AF2}"/>
-                </a:ext>
-              </a:extLst>
-            </p:cNvPr>
-            <p:cNvSpPr/>
-            <p:nvPr/>
-          </p:nvSpPr>
-          <p:spPr>
-            <a:xfrm>
-              <a:off x="5254239" y="937549"/>
-              <a:ext cx="1862057" cy="379917"/>
-            </a:xfrm>
-            <a:prstGeom prst="roundRect">
-              <a:avLst/>
-            </a:prstGeom>
-            <a:noFill/>
-            <a:ln>
-              <a:solidFill>
-                <a:schemeClr val="tx1"/>
-              </a:solidFill>
-            </a:ln>
-          </p:spPr>
-          <p:style>
-            <a:lnRef idx="2">
-              <a:schemeClr val="accent1">
-                <a:shade val="50000"/>
-              </a:schemeClr>
-            </a:lnRef>
-            <a:fillRef idx="1">
-              <a:schemeClr val="accent1"/>
-            </a:fillRef>
-            <a:effectRef idx="0">
-              <a:schemeClr val="accent1"/>
-            </a:effectRef>
-            <a:fontRef idx="minor">
-              <a:schemeClr val="lt1"/>
-            </a:fontRef>
-          </p:style>
-          <p:txBody>
-            <a:bodyPr rtlCol="0" anchor="ctr"/>
-            <a:lstStyle/>
-            <a:p>
-              <a:r>
-                <a:rPr lang="en-US" dirty="0">
-                  <a:solidFill>
-                    <a:schemeClr val="tx1"/>
-                  </a:solidFill>
-                </a:rPr>
-                <a:t>Submit button</a:t>
-              </a:r>
-            </a:p>
-          </p:txBody>
-        </p:sp>
-      </p:grpSp>
+          </a:ln>
+        </p:spPr>
+        <p:style>
+          <a:lnRef idx="2">
+            <a:schemeClr val="accent1">
+              <a:shade val="50000"/>
+            </a:schemeClr>
+          </a:lnRef>
+          <a:fillRef idx="1">
+            <a:schemeClr val="accent1"/>
+          </a:fillRef>
+          <a:effectRef idx="0">
+            <a:schemeClr val="accent1"/>
+          </a:effectRef>
+          <a:fontRef idx="minor">
+            <a:schemeClr val="lt1"/>
+          </a:fontRef>
+        </p:style>
+        <p:txBody>
+          <a:bodyPr wrap="none" rtlCol="0" anchor="ctr">
+            <a:spAutoFit/>
+          </a:bodyPr>
+          <a:lstStyle/>
+          <a:p>
+            <a:r>
+              <a:rPr lang="en-US" dirty="0">
+                <a:solidFill>
+                  <a:schemeClr val="tx1"/>
+                </a:solidFill>
+              </a:rPr>
+              <a:t>x</a:t>
+            </a:r>
+          </a:p>
+        </p:txBody>
+      </p:sp>
     </p:spTree>
     <p:extLst>
       <p:ext uri="{BB962C8B-B14F-4D97-AF65-F5344CB8AC3E}">

</xml_diff>